<commit_message>
container app icons added
</commit_message>
<xml_diff>
--- a/docs/Media.pptx
+++ b/docs/Media.pptx
@@ -7,8 +7,9 @@
   <p:sldIdLst>
     <p:sldId id="256" r:id="rId2"/>
     <p:sldId id="257" r:id="rId3"/>
-    <p:sldId id="258" r:id="rId4"/>
-    <p:sldId id="259" r:id="rId5"/>
+    <p:sldId id="260" r:id="rId4"/>
+    <p:sldId id="258" r:id="rId5"/>
+    <p:sldId id="259" r:id="rId6"/>
   </p:sldIdLst>
   <p:sldSz cx="12192000" cy="6858000"/>
   <p:notesSz cx="6858000" cy="9144000"/>
@@ -262,7 +263,7 @@
           <a:p>
             <a:fld id="{011E3A52-CBF7-4130-8D1C-4AD0B509F5F3}" type="datetimeFigureOut">
               <a:rPr lang="en-US" smtClean="0"/>
-              <a:t>5/15/2025</a:t>
+              <a:t>5/16/2025</a:t>
             </a:fld>
             <a:endParaRPr lang="en-US"/>
           </a:p>
@@ -460,7 +461,7 @@
           <a:p>
             <a:fld id="{011E3A52-CBF7-4130-8D1C-4AD0B509F5F3}" type="datetimeFigureOut">
               <a:rPr lang="en-US" smtClean="0"/>
-              <a:t>5/15/2025</a:t>
+              <a:t>5/16/2025</a:t>
             </a:fld>
             <a:endParaRPr lang="en-US"/>
           </a:p>
@@ -668,7 +669,7 @@
           <a:p>
             <a:fld id="{011E3A52-CBF7-4130-8D1C-4AD0B509F5F3}" type="datetimeFigureOut">
               <a:rPr lang="en-US" smtClean="0"/>
-              <a:t>5/15/2025</a:t>
+              <a:t>5/16/2025</a:t>
             </a:fld>
             <a:endParaRPr lang="en-US"/>
           </a:p>
@@ -866,7 +867,7 @@
           <a:p>
             <a:fld id="{011E3A52-CBF7-4130-8D1C-4AD0B509F5F3}" type="datetimeFigureOut">
               <a:rPr lang="en-US" smtClean="0"/>
-              <a:t>5/15/2025</a:t>
+              <a:t>5/16/2025</a:t>
             </a:fld>
             <a:endParaRPr lang="en-US"/>
           </a:p>
@@ -1141,7 +1142,7 @@
           <a:p>
             <a:fld id="{011E3A52-CBF7-4130-8D1C-4AD0B509F5F3}" type="datetimeFigureOut">
               <a:rPr lang="en-US" smtClean="0"/>
-              <a:t>5/15/2025</a:t>
+              <a:t>5/16/2025</a:t>
             </a:fld>
             <a:endParaRPr lang="en-US"/>
           </a:p>
@@ -1406,7 +1407,7 @@
           <a:p>
             <a:fld id="{011E3A52-CBF7-4130-8D1C-4AD0B509F5F3}" type="datetimeFigureOut">
               <a:rPr lang="en-US" smtClean="0"/>
-              <a:t>5/15/2025</a:t>
+              <a:t>5/16/2025</a:t>
             </a:fld>
             <a:endParaRPr lang="en-US"/>
           </a:p>
@@ -1818,7 +1819,7 @@
           <a:p>
             <a:fld id="{011E3A52-CBF7-4130-8D1C-4AD0B509F5F3}" type="datetimeFigureOut">
               <a:rPr lang="en-US" smtClean="0"/>
-              <a:t>5/15/2025</a:t>
+              <a:t>5/16/2025</a:t>
             </a:fld>
             <a:endParaRPr lang="en-US"/>
           </a:p>
@@ -1959,7 +1960,7 @@
           <a:p>
             <a:fld id="{011E3A52-CBF7-4130-8D1C-4AD0B509F5F3}" type="datetimeFigureOut">
               <a:rPr lang="en-US" smtClean="0"/>
-              <a:t>5/15/2025</a:t>
+              <a:t>5/16/2025</a:t>
             </a:fld>
             <a:endParaRPr lang="en-US"/>
           </a:p>
@@ -2072,7 +2073,7 @@
           <a:p>
             <a:fld id="{011E3A52-CBF7-4130-8D1C-4AD0B509F5F3}" type="datetimeFigureOut">
               <a:rPr lang="en-US" smtClean="0"/>
-              <a:t>5/15/2025</a:t>
+              <a:t>5/16/2025</a:t>
             </a:fld>
             <a:endParaRPr lang="en-US"/>
           </a:p>
@@ -2383,7 +2384,7 @@
           <a:p>
             <a:fld id="{011E3A52-CBF7-4130-8D1C-4AD0B509F5F3}" type="datetimeFigureOut">
               <a:rPr lang="en-US" smtClean="0"/>
-              <a:t>5/15/2025</a:t>
+              <a:t>5/16/2025</a:t>
             </a:fld>
             <a:endParaRPr lang="en-US"/>
           </a:p>
@@ -2671,7 +2672,7 @@
           <a:p>
             <a:fld id="{011E3A52-CBF7-4130-8D1C-4AD0B509F5F3}" type="datetimeFigureOut">
               <a:rPr lang="en-US" smtClean="0"/>
-              <a:t>5/15/2025</a:t>
+              <a:t>5/16/2025</a:t>
             </a:fld>
             <a:endParaRPr lang="en-US"/>
           </a:p>
@@ -2912,7 +2913,7 @@
           <a:p>
             <a:fld id="{011E3A52-CBF7-4130-8D1C-4AD0B509F5F3}" type="datetimeFigureOut">
               <a:rPr lang="en-US" smtClean="0"/>
-              <a:t>5/15/2025</a:t>
+              <a:t>5/16/2025</a:t>
             </a:fld>
             <a:endParaRPr lang="en-US"/>
           </a:p>
@@ -4479,6 +4480,1148 @@
         <p:cNvPr id="1" name="">
           <a:extLst>
             <a:ext uri="{FF2B5EF4-FFF2-40B4-BE49-F238E27FC236}">
+              <a16:creationId xmlns:a16="http://schemas.microsoft.com/office/drawing/2014/main" id="{A4B8872F-3BB8-82F6-DA2D-6919318F4D48}"/>
+            </a:ext>
+          </a:extLst>
+        </p:cNvPr>
+        <p:cNvGrpSpPr/>
+        <p:nvPr/>
+      </p:nvGrpSpPr>
+      <p:grpSpPr>
+        <a:xfrm>
+          <a:off x="0" y="0"/>
+          <a:ext cx="0" cy="0"/>
+          <a:chOff x="0" y="0"/>
+          <a:chExt cx="0" cy="0"/>
+        </a:xfrm>
+      </p:grpSpPr>
+      <p:pic>
+        <p:nvPicPr>
+          <p:cNvPr id="7" name="Picture 6">
+            <a:extLst>
+              <a:ext uri="{FF2B5EF4-FFF2-40B4-BE49-F238E27FC236}">
+                <a16:creationId xmlns:a16="http://schemas.microsoft.com/office/drawing/2014/main" id="{73E743F3-A7C4-CB32-6F98-9DF2C1A7BB1B}"/>
+              </a:ext>
+            </a:extLst>
+          </p:cNvPr>
+          <p:cNvPicPr>
+            <a:picLocks noChangeAspect="1"/>
+          </p:cNvPicPr>
+          <p:nvPr/>
+        </p:nvPicPr>
+        <p:blipFill>
+          <a:blip r:embed="rId2"/>
+          <a:stretch>
+            <a:fillRect/>
+          </a:stretch>
+        </p:blipFill>
+        <p:spPr>
+          <a:xfrm>
+            <a:off x="1413655" y="3223356"/>
+            <a:ext cx="1038866" cy="1050945"/>
+          </a:xfrm>
+          <a:prstGeom prst="rect">
+            <a:avLst/>
+          </a:prstGeom>
+        </p:spPr>
+      </p:pic>
+      <p:sp>
+        <p:nvSpPr>
+          <p:cNvPr id="9" name="Rectangle 8">
+            <a:extLst>
+              <a:ext uri="{FF2B5EF4-FFF2-40B4-BE49-F238E27FC236}">
+                <a16:creationId xmlns:a16="http://schemas.microsoft.com/office/drawing/2014/main" id="{92831C24-79A0-91B5-F01F-8B1F7993149D}"/>
+              </a:ext>
+            </a:extLst>
+          </p:cNvPr>
+          <p:cNvSpPr/>
+          <p:nvPr/>
+        </p:nvSpPr>
+        <p:spPr>
+          <a:xfrm>
+            <a:off x="1068405" y="2059805"/>
+            <a:ext cx="1886951" cy="3811604"/>
+          </a:xfrm>
+          <a:prstGeom prst="rect">
+            <a:avLst/>
+          </a:prstGeom>
+          <a:noFill/>
+          <a:ln w="25400">
+            <a:solidFill>
+              <a:schemeClr val="accent4"/>
+            </a:solidFill>
+          </a:ln>
+        </p:spPr>
+        <p:style>
+          <a:lnRef idx="2">
+            <a:schemeClr val="accent1">
+              <a:shade val="15000"/>
+            </a:schemeClr>
+          </a:lnRef>
+          <a:fillRef idx="1">
+            <a:schemeClr val="accent1"/>
+          </a:fillRef>
+          <a:effectRef idx="0">
+            <a:schemeClr val="accent1"/>
+          </a:effectRef>
+          <a:fontRef idx="minor">
+            <a:schemeClr val="lt1"/>
+          </a:fontRef>
+        </p:style>
+        <p:txBody>
+          <a:bodyPr rtlCol="0" anchor="ctr"/>
+          <a:lstStyle/>
+          <a:p>
+            <a:pPr algn="ctr"/>
+            <a:endParaRPr lang="en-US"/>
+          </a:p>
+        </p:txBody>
+      </p:sp>
+      <p:pic>
+        <p:nvPicPr>
+          <p:cNvPr id="14" name="Picture 13" descr="A blue and pink logo&#10;&#10;AI-generated content may be incorrect.">
+            <a:extLst>
+              <a:ext uri="{FF2B5EF4-FFF2-40B4-BE49-F238E27FC236}">
+                <a16:creationId xmlns:a16="http://schemas.microsoft.com/office/drawing/2014/main" id="{9861798A-5924-C09A-69A9-93FED72BD4F2}"/>
+              </a:ext>
+            </a:extLst>
+          </p:cNvPr>
+          <p:cNvPicPr>
+            <a:picLocks noChangeAspect="1"/>
+          </p:cNvPicPr>
+          <p:nvPr/>
+        </p:nvPicPr>
+        <p:blipFill>
+          <a:blip r:embed="rId3">
+            <a:extLst>
+              <a:ext uri="{28A0092B-C50C-407E-A947-70E740481C1C}">
+                <a14:useLocalDpi xmlns:a14="http://schemas.microsoft.com/office/drawing/2010/main" val="0"/>
+              </a:ext>
+            </a:extLst>
+          </a:blip>
+          <a:stretch>
+            <a:fillRect/>
+          </a:stretch>
+        </p:blipFill>
+        <p:spPr>
+          <a:xfrm>
+            <a:off x="9228088" y="2142856"/>
+            <a:ext cx="2180881" cy="1348261"/>
+          </a:xfrm>
+          <a:prstGeom prst="rect">
+            <a:avLst/>
+          </a:prstGeom>
+        </p:spPr>
+      </p:pic>
+      <p:pic>
+        <p:nvPicPr>
+          <p:cNvPr id="16" name="Picture 15" descr="A blue container with a white elephant on it&#10;&#10;AI-generated content may be incorrect.">
+            <a:extLst>
+              <a:ext uri="{FF2B5EF4-FFF2-40B4-BE49-F238E27FC236}">
+                <a16:creationId xmlns:a16="http://schemas.microsoft.com/office/drawing/2014/main" id="{B36DDFB3-E885-E5BE-8E04-9CC1C85C8AC4}"/>
+              </a:ext>
+            </a:extLst>
+          </p:cNvPr>
+          <p:cNvPicPr>
+            <a:picLocks noChangeAspect="1"/>
+          </p:cNvPicPr>
+          <p:nvPr/>
+        </p:nvPicPr>
+        <p:blipFill>
+          <a:blip r:embed="rId4">
+            <a:extLst>
+              <a:ext uri="{28A0092B-C50C-407E-A947-70E740481C1C}">
+                <a14:useLocalDpi xmlns:a14="http://schemas.microsoft.com/office/drawing/2010/main" val="0"/>
+              </a:ext>
+            </a:extLst>
+          </a:blip>
+          <a:stretch>
+            <a:fillRect/>
+          </a:stretch>
+        </p:blipFill>
+        <p:spPr>
+          <a:xfrm flipH="1">
+            <a:off x="9659102" y="3574169"/>
+            <a:ext cx="1470323" cy="908981"/>
+          </a:xfrm>
+          <a:prstGeom prst="rect">
+            <a:avLst/>
+          </a:prstGeom>
+        </p:spPr>
+      </p:pic>
+      <p:sp>
+        <p:nvSpPr>
+          <p:cNvPr id="19" name="Rectangle 18">
+            <a:extLst>
+              <a:ext uri="{FF2B5EF4-FFF2-40B4-BE49-F238E27FC236}">
+                <a16:creationId xmlns:a16="http://schemas.microsoft.com/office/drawing/2014/main" id="{92DA29E9-DD1A-06AA-FABD-284566577593}"/>
+              </a:ext>
+            </a:extLst>
+          </p:cNvPr>
+          <p:cNvSpPr/>
+          <p:nvPr/>
+        </p:nvSpPr>
+        <p:spPr>
+          <a:xfrm>
+            <a:off x="3691839" y="2059805"/>
+            <a:ext cx="4922772" cy="3811604"/>
+          </a:xfrm>
+          <a:prstGeom prst="rect">
+            <a:avLst/>
+          </a:prstGeom>
+          <a:noFill/>
+          <a:ln w="25400">
+            <a:solidFill>
+              <a:schemeClr val="accent4"/>
+            </a:solidFill>
+          </a:ln>
+        </p:spPr>
+        <p:style>
+          <a:lnRef idx="2">
+            <a:schemeClr val="accent1">
+              <a:shade val="15000"/>
+            </a:schemeClr>
+          </a:lnRef>
+          <a:fillRef idx="1">
+            <a:schemeClr val="accent1"/>
+          </a:fillRef>
+          <a:effectRef idx="0">
+            <a:schemeClr val="accent1"/>
+          </a:effectRef>
+          <a:fontRef idx="minor">
+            <a:schemeClr val="lt1"/>
+          </a:fontRef>
+        </p:style>
+        <p:txBody>
+          <a:bodyPr rtlCol="0" anchor="ctr"/>
+          <a:lstStyle/>
+          <a:p>
+            <a:pPr algn="ctr"/>
+            <a:endParaRPr lang="en-US"/>
+          </a:p>
+        </p:txBody>
+      </p:sp>
+      <p:sp>
+        <p:nvSpPr>
+          <p:cNvPr id="22" name="Rectangle 21">
+            <a:extLst>
+              <a:ext uri="{FF2B5EF4-FFF2-40B4-BE49-F238E27FC236}">
+                <a16:creationId xmlns:a16="http://schemas.microsoft.com/office/drawing/2014/main" id="{FC9D73AE-4D0A-460B-81D1-2B32654A9FFB}"/>
+              </a:ext>
+            </a:extLst>
+          </p:cNvPr>
+          <p:cNvSpPr/>
+          <p:nvPr/>
+        </p:nvSpPr>
+        <p:spPr>
+          <a:xfrm>
+            <a:off x="3974421" y="4439077"/>
+            <a:ext cx="1626917" cy="1297577"/>
+          </a:xfrm>
+          <a:prstGeom prst="rect">
+            <a:avLst/>
+          </a:prstGeom>
+          <a:noFill/>
+          <a:ln>
+            <a:solidFill>
+              <a:schemeClr val="accent4"/>
+            </a:solidFill>
+          </a:ln>
+        </p:spPr>
+        <p:style>
+          <a:lnRef idx="2">
+            <a:schemeClr val="accent1">
+              <a:shade val="15000"/>
+            </a:schemeClr>
+          </a:lnRef>
+          <a:fillRef idx="1">
+            <a:schemeClr val="accent1"/>
+          </a:fillRef>
+          <a:effectRef idx="0">
+            <a:schemeClr val="accent1"/>
+          </a:effectRef>
+          <a:fontRef idx="minor">
+            <a:schemeClr val="lt1"/>
+          </a:fontRef>
+        </p:style>
+        <p:txBody>
+          <a:bodyPr rtlCol="0" anchor="ctr"/>
+          <a:lstStyle/>
+          <a:p>
+            <a:r>
+              <a:rPr lang="en-US" b="1" dirty="0">
+                <a:solidFill>
+                  <a:schemeClr val="tx1"/>
+                </a:solidFill>
+              </a:rPr>
+              <a:t>Login API</a:t>
+            </a:r>
+            <a:br>
+              <a:rPr lang="en-US" b="1" dirty="0">
+                <a:solidFill>
+                  <a:schemeClr val="tx1"/>
+                </a:solidFill>
+              </a:rPr>
+            </a:br>
+            <a:r>
+              <a:rPr lang="en-US" b="1" dirty="0">
+                <a:solidFill>
+                  <a:schemeClr val="tx1"/>
+                </a:solidFill>
+              </a:rPr>
+              <a:t>Logout API</a:t>
+            </a:r>
+          </a:p>
+          <a:p>
+            <a:r>
+              <a:rPr lang="en-US" sz="1600" dirty="0">
+                <a:solidFill>
+                  <a:schemeClr val="tx1"/>
+                </a:solidFill>
+              </a:rPr>
+              <a:t>User Authentication</a:t>
+            </a:r>
+          </a:p>
+        </p:txBody>
+      </p:sp>
+      <p:sp>
+        <p:nvSpPr>
+          <p:cNvPr id="23" name="Rectangle 22">
+            <a:extLst>
+              <a:ext uri="{FF2B5EF4-FFF2-40B4-BE49-F238E27FC236}">
+                <a16:creationId xmlns:a16="http://schemas.microsoft.com/office/drawing/2014/main" id="{F5A223D6-DA60-3C2B-F3BB-779422F92AFA}"/>
+              </a:ext>
+            </a:extLst>
+          </p:cNvPr>
+          <p:cNvSpPr/>
+          <p:nvPr/>
+        </p:nvSpPr>
+        <p:spPr>
+          <a:xfrm>
+            <a:off x="3974422" y="2825225"/>
+            <a:ext cx="1626917" cy="1527796"/>
+          </a:xfrm>
+          <a:prstGeom prst="rect">
+            <a:avLst/>
+          </a:prstGeom>
+          <a:noFill/>
+          <a:ln>
+            <a:solidFill>
+              <a:schemeClr val="accent4"/>
+            </a:solidFill>
+          </a:ln>
+        </p:spPr>
+        <p:style>
+          <a:lnRef idx="2">
+            <a:schemeClr val="accent1">
+              <a:shade val="15000"/>
+            </a:schemeClr>
+          </a:lnRef>
+          <a:fillRef idx="1">
+            <a:schemeClr val="accent1"/>
+          </a:fillRef>
+          <a:effectRef idx="0">
+            <a:schemeClr val="accent1"/>
+          </a:effectRef>
+          <a:fontRef idx="minor">
+            <a:schemeClr val="lt1"/>
+          </a:fontRef>
+        </p:style>
+        <p:txBody>
+          <a:bodyPr rtlCol="0" anchor="ctr"/>
+          <a:lstStyle/>
+          <a:p>
+            <a:r>
+              <a:rPr lang="en-US" b="1" dirty="0">
+                <a:solidFill>
+                  <a:schemeClr val="tx1"/>
+                </a:solidFill>
+              </a:rPr>
+              <a:t>Chat API</a:t>
+            </a:r>
+          </a:p>
+          <a:p>
+            <a:r>
+              <a:rPr lang="en-US" sz="1600" dirty="0">
+                <a:solidFill>
+                  <a:schemeClr val="tx1"/>
+                </a:solidFill>
+              </a:rPr>
+              <a:t>Chat with Shopping Agent</a:t>
+            </a:r>
+          </a:p>
+        </p:txBody>
+      </p:sp>
+      <p:sp>
+        <p:nvSpPr>
+          <p:cNvPr id="24" name="Rectangle 23">
+            <a:extLst>
+              <a:ext uri="{FF2B5EF4-FFF2-40B4-BE49-F238E27FC236}">
+                <a16:creationId xmlns:a16="http://schemas.microsoft.com/office/drawing/2014/main" id="{07152715-25FC-881A-E7C5-AB1F20C67BE0}"/>
+              </a:ext>
+            </a:extLst>
+          </p:cNvPr>
+          <p:cNvSpPr/>
+          <p:nvPr/>
+        </p:nvSpPr>
+        <p:spPr>
+          <a:xfrm>
+            <a:off x="5855472" y="2829820"/>
+            <a:ext cx="2403004" cy="1523201"/>
+          </a:xfrm>
+          <a:prstGeom prst="rect">
+            <a:avLst/>
+          </a:prstGeom>
+          <a:noFill/>
+          <a:ln>
+            <a:solidFill>
+              <a:schemeClr val="accent4"/>
+            </a:solidFill>
+          </a:ln>
+        </p:spPr>
+        <p:style>
+          <a:lnRef idx="2">
+            <a:schemeClr val="accent1">
+              <a:shade val="15000"/>
+            </a:schemeClr>
+          </a:lnRef>
+          <a:fillRef idx="1">
+            <a:schemeClr val="accent1"/>
+          </a:fillRef>
+          <a:effectRef idx="0">
+            <a:schemeClr val="accent1"/>
+          </a:effectRef>
+          <a:fontRef idx="minor">
+            <a:schemeClr val="lt1"/>
+          </a:fontRef>
+        </p:style>
+        <p:txBody>
+          <a:bodyPr rtlCol="0" anchor="ctr"/>
+          <a:lstStyle/>
+          <a:p>
+            <a:r>
+              <a:rPr lang="en-US" b="1" dirty="0">
+                <a:solidFill>
+                  <a:schemeClr val="tx1"/>
+                </a:solidFill>
+              </a:rPr>
+              <a:t>Semantic Kernel </a:t>
+            </a:r>
+          </a:p>
+          <a:p>
+            <a:r>
+              <a:rPr lang="en-US" sz="1600" dirty="0">
+                <a:solidFill>
+                  <a:schemeClr val="tx1"/>
+                </a:solidFill>
+              </a:rPr>
+              <a:t>Shop Managing Agent, Order Agent, </a:t>
+            </a:r>
+          </a:p>
+          <a:p>
+            <a:r>
+              <a:rPr lang="en-US" sz="1600" dirty="0">
+                <a:solidFill>
+                  <a:schemeClr val="tx1"/>
+                </a:solidFill>
+              </a:rPr>
+              <a:t>Cart Agent,</a:t>
+            </a:r>
+          </a:p>
+          <a:p>
+            <a:r>
+              <a:rPr lang="en-US" sz="1600" dirty="0">
+                <a:solidFill>
+                  <a:schemeClr val="tx1"/>
+                </a:solidFill>
+              </a:rPr>
+              <a:t>Offer Agent </a:t>
+            </a:r>
+          </a:p>
+        </p:txBody>
+      </p:sp>
+      <p:sp>
+        <p:nvSpPr>
+          <p:cNvPr id="25" name="Rectangle 24">
+            <a:extLst>
+              <a:ext uri="{FF2B5EF4-FFF2-40B4-BE49-F238E27FC236}">
+                <a16:creationId xmlns:a16="http://schemas.microsoft.com/office/drawing/2014/main" id="{63A1F4AC-40BF-E60F-B606-E5AB8A79EF89}"/>
+              </a:ext>
+            </a:extLst>
+          </p:cNvPr>
+          <p:cNvSpPr/>
+          <p:nvPr/>
+        </p:nvSpPr>
+        <p:spPr>
+          <a:xfrm>
+            <a:off x="9333364" y="2059804"/>
+            <a:ext cx="2160862" cy="3811605"/>
+          </a:xfrm>
+          <a:prstGeom prst="rect">
+            <a:avLst/>
+          </a:prstGeom>
+          <a:noFill/>
+          <a:ln w="25400">
+            <a:solidFill>
+              <a:schemeClr val="accent4"/>
+            </a:solidFill>
+          </a:ln>
+        </p:spPr>
+        <p:style>
+          <a:lnRef idx="2">
+            <a:schemeClr val="accent1">
+              <a:shade val="15000"/>
+            </a:schemeClr>
+          </a:lnRef>
+          <a:fillRef idx="1">
+            <a:schemeClr val="accent1"/>
+          </a:fillRef>
+          <a:effectRef idx="0">
+            <a:schemeClr val="accent1"/>
+          </a:effectRef>
+          <a:fontRef idx="minor">
+            <a:schemeClr val="lt1"/>
+          </a:fontRef>
+        </p:style>
+        <p:txBody>
+          <a:bodyPr rtlCol="0" anchor="ctr"/>
+          <a:lstStyle/>
+          <a:p>
+            <a:pPr algn="ctr"/>
+            <a:endParaRPr lang="en-US"/>
+          </a:p>
+        </p:txBody>
+      </p:sp>
+      <p:sp>
+        <p:nvSpPr>
+          <p:cNvPr id="27" name="TextBox 26">
+            <a:extLst>
+              <a:ext uri="{FF2B5EF4-FFF2-40B4-BE49-F238E27FC236}">
+                <a16:creationId xmlns:a16="http://schemas.microsoft.com/office/drawing/2014/main" id="{98EC10E5-3705-DB2C-0662-E572181CF803}"/>
+              </a:ext>
+            </a:extLst>
+          </p:cNvPr>
+          <p:cNvSpPr txBox="1"/>
+          <p:nvPr/>
+        </p:nvSpPr>
+        <p:spPr>
+          <a:xfrm>
+            <a:off x="4192124" y="2226713"/>
+            <a:ext cx="3711972" cy="369332"/>
+          </a:xfrm>
+          <a:prstGeom prst="rect">
+            <a:avLst/>
+          </a:prstGeom>
+          <a:noFill/>
+        </p:spPr>
+        <p:txBody>
+          <a:bodyPr wrap="square">
+            <a:spAutoFit/>
+          </a:bodyPr>
+          <a:lstStyle/>
+          <a:p>
+            <a:r>
+              <a:rPr lang="en-US" b="1" dirty="0">
+                <a:solidFill>
+                  <a:schemeClr val="tx1"/>
+                </a:solidFill>
+              </a:rPr>
+              <a:t>Backend App (Python </a:t>
+            </a:r>
+            <a:r>
+              <a:rPr lang="en-US" b="1" dirty="0" err="1">
+                <a:solidFill>
+                  <a:schemeClr val="tx1"/>
+                </a:solidFill>
+              </a:rPr>
+              <a:t>FastAPI</a:t>
+            </a:r>
+            <a:r>
+              <a:rPr lang="en-US" b="1" dirty="0">
+                <a:solidFill>
+                  <a:schemeClr val="tx1"/>
+                </a:solidFill>
+              </a:rPr>
+              <a:t>) </a:t>
+            </a:r>
+          </a:p>
+        </p:txBody>
+      </p:sp>
+      <p:sp>
+        <p:nvSpPr>
+          <p:cNvPr id="28" name="Rectangle 27">
+            <a:extLst>
+              <a:ext uri="{FF2B5EF4-FFF2-40B4-BE49-F238E27FC236}">
+                <a16:creationId xmlns:a16="http://schemas.microsoft.com/office/drawing/2014/main" id="{3AD68A35-41DF-CF19-692A-9C5971FCFB87}"/>
+              </a:ext>
+            </a:extLst>
+          </p:cNvPr>
+          <p:cNvSpPr/>
+          <p:nvPr/>
+        </p:nvSpPr>
+        <p:spPr>
+          <a:xfrm>
+            <a:off x="1251521" y="4387467"/>
+            <a:ext cx="1520717" cy="1370776"/>
+          </a:xfrm>
+          <a:prstGeom prst="rect">
+            <a:avLst/>
+          </a:prstGeom>
+          <a:noFill/>
+          <a:ln>
+            <a:solidFill>
+              <a:schemeClr val="accent4"/>
+            </a:solidFill>
+          </a:ln>
+        </p:spPr>
+        <p:style>
+          <a:lnRef idx="2">
+            <a:schemeClr val="accent1">
+              <a:shade val="15000"/>
+            </a:schemeClr>
+          </a:lnRef>
+          <a:fillRef idx="1">
+            <a:schemeClr val="accent1"/>
+          </a:fillRef>
+          <a:effectRef idx="0">
+            <a:schemeClr val="accent1"/>
+          </a:effectRef>
+          <a:fontRef idx="minor">
+            <a:schemeClr val="lt1"/>
+          </a:fontRef>
+        </p:style>
+        <p:txBody>
+          <a:bodyPr rtlCol="0" anchor="ctr"/>
+          <a:lstStyle/>
+          <a:p>
+            <a:r>
+              <a:rPr lang="en-US" sz="1600" b="1" dirty="0">
+                <a:solidFill>
+                  <a:schemeClr val="tx1"/>
+                </a:solidFill>
+              </a:rPr>
+              <a:t>UI Features</a:t>
+            </a:r>
+          </a:p>
+          <a:p>
+            <a:r>
+              <a:rPr lang="en-US" sz="1600" dirty="0">
+                <a:solidFill>
+                  <a:schemeClr val="tx1"/>
+                </a:solidFill>
+              </a:rPr>
+              <a:t>User Register</a:t>
+            </a:r>
+          </a:p>
+          <a:p>
+            <a:r>
+              <a:rPr lang="en-US" sz="1600" dirty="0">
+                <a:solidFill>
+                  <a:schemeClr val="tx1"/>
+                </a:solidFill>
+              </a:rPr>
+              <a:t>User Login</a:t>
+            </a:r>
+          </a:p>
+          <a:p>
+            <a:r>
+              <a:rPr lang="en-US" sz="1600" dirty="0">
+                <a:solidFill>
+                  <a:schemeClr val="tx1"/>
+                </a:solidFill>
+              </a:rPr>
+              <a:t>User Logout </a:t>
+            </a:r>
+          </a:p>
+          <a:p>
+            <a:r>
+              <a:rPr lang="en-US" sz="1600" dirty="0">
+                <a:solidFill>
+                  <a:schemeClr val="tx1"/>
+                </a:solidFill>
+              </a:rPr>
+              <a:t>Chat </a:t>
+            </a:r>
+          </a:p>
+        </p:txBody>
+      </p:sp>
+      <p:sp>
+        <p:nvSpPr>
+          <p:cNvPr id="29" name="TextBox 28">
+            <a:extLst>
+              <a:ext uri="{FF2B5EF4-FFF2-40B4-BE49-F238E27FC236}">
+                <a16:creationId xmlns:a16="http://schemas.microsoft.com/office/drawing/2014/main" id="{240D893A-21D9-870A-E454-8BF80FC74C02}"/>
+              </a:ext>
+            </a:extLst>
+          </p:cNvPr>
+          <p:cNvSpPr txBox="1"/>
+          <p:nvPr/>
+        </p:nvSpPr>
+        <p:spPr>
+          <a:xfrm>
+            <a:off x="1072154" y="2186860"/>
+            <a:ext cx="1879449" cy="923330"/>
+          </a:xfrm>
+          <a:prstGeom prst="rect">
+            <a:avLst/>
+          </a:prstGeom>
+          <a:noFill/>
+        </p:spPr>
+        <p:txBody>
+          <a:bodyPr wrap="square">
+            <a:spAutoFit/>
+          </a:bodyPr>
+          <a:lstStyle/>
+          <a:p>
+            <a:r>
+              <a:rPr lang="en-US" b="1" dirty="0"/>
+              <a:t>Frontend </a:t>
+            </a:r>
+          </a:p>
+          <a:p>
+            <a:r>
+              <a:rPr lang="en-US" b="1" dirty="0"/>
+              <a:t>Web App (React)</a:t>
+            </a:r>
+            <a:endParaRPr lang="en-US" b="1" dirty="0">
+              <a:solidFill>
+                <a:schemeClr val="tx1"/>
+              </a:solidFill>
+            </a:endParaRPr>
+          </a:p>
+        </p:txBody>
+      </p:sp>
+      <p:cxnSp>
+        <p:nvCxnSpPr>
+          <p:cNvPr id="31" name="Straight Arrow Connector 30">
+            <a:extLst>
+              <a:ext uri="{FF2B5EF4-FFF2-40B4-BE49-F238E27FC236}">
+                <a16:creationId xmlns:a16="http://schemas.microsoft.com/office/drawing/2014/main" id="{51015111-21A0-23B6-FEB5-B91E1F781569}"/>
+              </a:ext>
+            </a:extLst>
+          </p:cNvPr>
+          <p:cNvCxnSpPr>
+            <a:cxnSpLocks/>
+            <a:stCxn id="9" idx="3"/>
+            <a:endCxn id="19" idx="1"/>
+          </p:cNvCxnSpPr>
+          <p:nvPr/>
+        </p:nvCxnSpPr>
+        <p:spPr>
+          <a:xfrm>
+            <a:off x="2955356" y="3965607"/>
+            <a:ext cx="736483" cy="0"/>
+          </a:xfrm>
+          <a:prstGeom prst="straightConnector1">
+            <a:avLst/>
+          </a:prstGeom>
+          <a:ln w="25400">
+            <a:solidFill>
+              <a:schemeClr val="accent4"/>
+            </a:solidFill>
+            <a:headEnd type="triangle"/>
+            <a:tailEnd type="triangle"/>
+          </a:ln>
+        </p:spPr>
+        <p:style>
+          <a:lnRef idx="2">
+            <a:schemeClr val="accent1"/>
+          </a:lnRef>
+          <a:fillRef idx="0">
+            <a:schemeClr val="accent1"/>
+          </a:fillRef>
+          <a:effectRef idx="1">
+            <a:schemeClr val="accent1"/>
+          </a:effectRef>
+          <a:fontRef idx="minor">
+            <a:schemeClr val="tx1"/>
+          </a:fontRef>
+        </p:style>
+      </p:cxnSp>
+      <p:cxnSp>
+        <p:nvCxnSpPr>
+          <p:cNvPr id="32" name="Straight Arrow Connector 31">
+            <a:extLst>
+              <a:ext uri="{FF2B5EF4-FFF2-40B4-BE49-F238E27FC236}">
+                <a16:creationId xmlns:a16="http://schemas.microsoft.com/office/drawing/2014/main" id="{E6C409BA-A113-F6E2-AA5D-460A200BEA4F}"/>
+              </a:ext>
+            </a:extLst>
+          </p:cNvPr>
+          <p:cNvCxnSpPr/>
+          <p:nvPr/>
+        </p:nvCxnSpPr>
+        <p:spPr>
+          <a:xfrm>
+            <a:off x="8596881" y="4057428"/>
+            <a:ext cx="736483" cy="0"/>
+          </a:xfrm>
+          <a:prstGeom prst="straightConnector1">
+            <a:avLst/>
+          </a:prstGeom>
+          <a:ln w="25400">
+            <a:solidFill>
+              <a:schemeClr val="accent4"/>
+            </a:solidFill>
+            <a:headEnd type="triangle"/>
+            <a:tailEnd type="triangle"/>
+          </a:ln>
+        </p:spPr>
+        <p:style>
+          <a:lnRef idx="2">
+            <a:schemeClr val="accent1"/>
+          </a:lnRef>
+          <a:fillRef idx="0">
+            <a:schemeClr val="accent1"/>
+          </a:fillRef>
+          <a:effectRef idx="1">
+            <a:schemeClr val="accent1"/>
+          </a:effectRef>
+          <a:fontRef idx="minor">
+            <a:schemeClr val="tx1"/>
+          </a:fontRef>
+        </p:style>
+      </p:cxnSp>
+      <p:sp>
+        <p:nvSpPr>
+          <p:cNvPr id="33" name="TextBox 32">
+            <a:extLst>
+              <a:ext uri="{FF2B5EF4-FFF2-40B4-BE49-F238E27FC236}">
+                <a16:creationId xmlns:a16="http://schemas.microsoft.com/office/drawing/2014/main" id="{5496013E-AD17-6925-DDF3-C10633A17FFA}"/>
+              </a:ext>
+            </a:extLst>
+          </p:cNvPr>
+          <p:cNvSpPr txBox="1"/>
+          <p:nvPr/>
+        </p:nvSpPr>
+        <p:spPr>
+          <a:xfrm>
+            <a:off x="5726000" y="4536325"/>
+            <a:ext cx="2589299" cy="1107996"/>
+          </a:xfrm>
+          <a:prstGeom prst="rect">
+            <a:avLst/>
+          </a:prstGeom>
+          <a:noFill/>
+        </p:spPr>
+        <p:txBody>
+          <a:bodyPr wrap="none" rtlCol="0">
+            <a:spAutoFit/>
+          </a:bodyPr>
+          <a:lstStyle/>
+          <a:p>
+            <a:r>
+              <a:rPr lang="en-US" b="1" dirty="0"/>
+              <a:t>Notes: </a:t>
+            </a:r>
+          </a:p>
+          <a:p>
+            <a:r>
+              <a:rPr lang="en-US" sz="1600" dirty="0"/>
+              <a:t>Secure Login </a:t>
+            </a:r>
+          </a:p>
+          <a:p>
+            <a:r>
+              <a:rPr lang="en-US" sz="1600" dirty="0"/>
+              <a:t>Token returns to Web App</a:t>
+            </a:r>
+          </a:p>
+          <a:p>
+            <a:r>
+              <a:rPr lang="en-US" sz="1600" dirty="0"/>
+              <a:t>Chat UI appears after Login</a:t>
+            </a:r>
+          </a:p>
+        </p:txBody>
+      </p:sp>
+      <p:sp>
+        <p:nvSpPr>
+          <p:cNvPr id="34" name="Rectangle 33">
+            <a:extLst>
+              <a:ext uri="{FF2B5EF4-FFF2-40B4-BE49-F238E27FC236}">
+                <a16:creationId xmlns:a16="http://schemas.microsoft.com/office/drawing/2014/main" id="{DE623BE3-44D1-8B11-8A09-E28BCB221E20}"/>
+              </a:ext>
+            </a:extLst>
+          </p:cNvPr>
+          <p:cNvSpPr/>
+          <p:nvPr/>
+        </p:nvSpPr>
+        <p:spPr>
+          <a:xfrm>
+            <a:off x="750770" y="1718109"/>
+            <a:ext cx="8171849" cy="4470934"/>
+          </a:xfrm>
+          <a:prstGeom prst="rect">
+            <a:avLst/>
+          </a:prstGeom>
+          <a:noFill/>
+          <a:ln w="25400">
+            <a:solidFill>
+              <a:schemeClr val="tx2"/>
+            </a:solidFill>
+            <a:prstDash val="dash"/>
+          </a:ln>
+        </p:spPr>
+        <p:style>
+          <a:lnRef idx="2">
+            <a:schemeClr val="accent1">
+              <a:shade val="15000"/>
+            </a:schemeClr>
+          </a:lnRef>
+          <a:fillRef idx="1">
+            <a:schemeClr val="accent1"/>
+          </a:fillRef>
+          <a:effectRef idx="0">
+            <a:schemeClr val="accent1"/>
+          </a:effectRef>
+          <a:fontRef idx="minor">
+            <a:schemeClr val="lt1"/>
+          </a:fontRef>
+        </p:style>
+        <p:txBody>
+          <a:bodyPr rtlCol="0" anchor="ctr"/>
+          <a:lstStyle/>
+          <a:p>
+            <a:pPr algn="ctr"/>
+            <a:endParaRPr lang="en-US"/>
+          </a:p>
+        </p:txBody>
+      </p:sp>
+      <p:pic>
+        <p:nvPicPr>
+          <p:cNvPr id="36" name="Picture 35">
+            <a:extLst>
+              <a:ext uri="{FF2B5EF4-FFF2-40B4-BE49-F238E27FC236}">
+                <a16:creationId xmlns:a16="http://schemas.microsoft.com/office/drawing/2014/main" id="{537743B8-8FB8-ABB8-37BF-CE856CF3AAF0}"/>
+              </a:ext>
+            </a:extLst>
+          </p:cNvPr>
+          <p:cNvPicPr>
+            <a:picLocks noChangeAspect="1"/>
+          </p:cNvPicPr>
+          <p:nvPr/>
+        </p:nvPicPr>
+        <p:blipFill>
+          <a:blip r:embed="rId5"/>
+          <a:stretch>
+            <a:fillRect/>
+          </a:stretch>
+        </p:blipFill>
+        <p:spPr>
+          <a:xfrm>
+            <a:off x="9960195" y="4702025"/>
+            <a:ext cx="938120" cy="771680"/>
+          </a:xfrm>
+          <a:prstGeom prst="rect">
+            <a:avLst/>
+          </a:prstGeom>
+        </p:spPr>
+      </p:pic>
+      <p:sp>
+        <p:nvSpPr>
+          <p:cNvPr id="37" name="Rectangle 36">
+            <a:extLst>
+              <a:ext uri="{FF2B5EF4-FFF2-40B4-BE49-F238E27FC236}">
+                <a16:creationId xmlns:a16="http://schemas.microsoft.com/office/drawing/2014/main" id="{3B2689F1-A5ED-2723-5564-855E44B84B01}"/>
+              </a:ext>
+            </a:extLst>
+          </p:cNvPr>
+          <p:cNvSpPr/>
+          <p:nvPr/>
+        </p:nvSpPr>
+        <p:spPr>
+          <a:xfrm>
+            <a:off x="3768841" y="1121346"/>
+            <a:ext cx="2828097" cy="627861"/>
+          </a:xfrm>
+          <a:prstGeom prst="rect">
+            <a:avLst/>
+          </a:prstGeom>
+          <a:noFill/>
+          <a:ln>
+            <a:noFill/>
+          </a:ln>
+        </p:spPr>
+        <p:style>
+          <a:lnRef idx="2">
+            <a:schemeClr val="accent1">
+              <a:shade val="15000"/>
+            </a:schemeClr>
+          </a:lnRef>
+          <a:fillRef idx="1">
+            <a:schemeClr val="accent1"/>
+          </a:fillRef>
+          <a:effectRef idx="0">
+            <a:schemeClr val="accent1"/>
+          </a:effectRef>
+          <a:fontRef idx="minor">
+            <a:schemeClr val="lt1"/>
+          </a:fontRef>
+        </p:style>
+        <p:txBody>
+          <a:bodyPr rtlCol="0" anchor="ctr"/>
+          <a:lstStyle/>
+          <a:p>
+            <a:r>
+              <a:rPr lang="en-US" b="1" dirty="0">
+                <a:solidFill>
+                  <a:schemeClr val="tx1"/>
+                </a:solidFill>
+              </a:rPr>
+              <a:t>Azure  Container Apps</a:t>
+            </a:r>
+          </a:p>
+        </p:txBody>
+      </p:sp>
+      <p:sp>
+        <p:nvSpPr>
+          <p:cNvPr id="38" name="Rectangle 37">
+            <a:extLst>
+              <a:ext uri="{FF2B5EF4-FFF2-40B4-BE49-F238E27FC236}">
+                <a16:creationId xmlns:a16="http://schemas.microsoft.com/office/drawing/2014/main" id="{39AE190B-BD17-B75C-6798-FD5355C256E4}"/>
+              </a:ext>
+            </a:extLst>
+          </p:cNvPr>
+          <p:cNvSpPr/>
+          <p:nvPr/>
+        </p:nvSpPr>
+        <p:spPr>
+          <a:xfrm>
+            <a:off x="2634937" y="413220"/>
+            <a:ext cx="6330185" cy="627861"/>
+          </a:xfrm>
+          <a:prstGeom prst="rect">
+            <a:avLst/>
+          </a:prstGeom>
+          <a:noFill/>
+          <a:ln>
+            <a:noFill/>
+          </a:ln>
+        </p:spPr>
+        <p:style>
+          <a:lnRef idx="2">
+            <a:schemeClr val="accent1">
+              <a:shade val="15000"/>
+            </a:schemeClr>
+          </a:lnRef>
+          <a:fillRef idx="1">
+            <a:schemeClr val="accent1"/>
+          </a:fillRef>
+          <a:effectRef idx="0">
+            <a:schemeClr val="accent1"/>
+          </a:effectRef>
+          <a:fontRef idx="minor">
+            <a:schemeClr val="lt1"/>
+          </a:fontRef>
+        </p:style>
+        <p:txBody>
+          <a:bodyPr rtlCol="0" anchor="ctr"/>
+          <a:lstStyle/>
+          <a:p>
+            <a:r>
+              <a:rPr lang="en-US" sz="2800" b="1" dirty="0">
+                <a:solidFill>
+                  <a:schemeClr val="tx1"/>
+                </a:solidFill>
+              </a:rPr>
+              <a:t>Shopping Assistant Architecture </a:t>
+            </a:r>
+          </a:p>
+        </p:txBody>
+      </p:sp>
+      <p:pic>
+        <p:nvPicPr>
+          <p:cNvPr id="3" name="Picture 2" descr="A logo of a company&#10;&#10;AI-generated content may be incorrect.">
+            <a:extLst>
+              <a:ext uri="{FF2B5EF4-FFF2-40B4-BE49-F238E27FC236}">
+                <a16:creationId xmlns:a16="http://schemas.microsoft.com/office/drawing/2014/main" id="{F2F4353A-D609-F3E7-1641-29099C425E0B}"/>
+              </a:ext>
+            </a:extLst>
+          </p:cNvPr>
+          <p:cNvPicPr>
+            <a:picLocks noChangeAspect="1"/>
+          </p:cNvPicPr>
+          <p:nvPr/>
+        </p:nvPicPr>
+        <p:blipFill>
+          <a:blip r:embed="rId6">
+            <a:extLst>
+              <a:ext uri="{28A0092B-C50C-407E-A947-70E740481C1C}">
+                <a14:useLocalDpi xmlns:a14="http://schemas.microsoft.com/office/drawing/2010/main" val="0"/>
+              </a:ext>
+            </a:extLst>
+          </a:blip>
+          <a:stretch>
+            <a:fillRect/>
+          </a:stretch>
+        </p:blipFill>
+        <p:spPr>
+          <a:xfrm>
+            <a:off x="2147703" y="1807657"/>
+            <a:ext cx="1013025" cy="902513"/>
+          </a:xfrm>
+          <a:prstGeom prst="rect">
+            <a:avLst/>
+          </a:prstGeom>
+        </p:spPr>
+      </p:pic>
+      <p:pic>
+        <p:nvPicPr>
+          <p:cNvPr id="4" name="Picture 3" descr="A logo of a company&#10;&#10;AI-generated content may be incorrect.">
+            <a:extLst>
+              <a:ext uri="{FF2B5EF4-FFF2-40B4-BE49-F238E27FC236}">
+                <a16:creationId xmlns:a16="http://schemas.microsoft.com/office/drawing/2014/main" id="{9F8DB409-387D-2EF9-0D86-B14107FAF4A2}"/>
+              </a:ext>
+            </a:extLst>
+          </p:cNvPr>
+          <p:cNvPicPr>
+            <a:picLocks noChangeAspect="1"/>
+          </p:cNvPicPr>
+          <p:nvPr/>
+        </p:nvPicPr>
+        <p:blipFill>
+          <a:blip r:embed="rId6">
+            <a:extLst>
+              <a:ext uri="{28A0092B-C50C-407E-A947-70E740481C1C}">
+                <a14:useLocalDpi xmlns:a14="http://schemas.microsoft.com/office/drawing/2010/main" val="0"/>
+              </a:ext>
+            </a:extLst>
+          </a:blip>
+          <a:stretch>
+            <a:fillRect/>
+          </a:stretch>
+        </p:blipFill>
+        <p:spPr>
+          <a:xfrm>
+            <a:off x="7806958" y="1744003"/>
+            <a:ext cx="1013025" cy="902513"/>
+          </a:xfrm>
+          <a:prstGeom prst="rect">
+            <a:avLst/>
+          </a:prstGeom>
+        </p:spPr>
+      </p:pic>
+    </p:spTree>
+    <p:extLst>
+      <p:ext uri="{BB962C8B-B14F-4D97-AF65-F5344CB8AC3E}">
+        <p14:creationId xmlns:p14="http://schemas.microsoft.com/office/powerpoint/2010/main" val="2773257890"/>
+      </p:ext>
+    </p:extLst>
+  </p:cSld>
+  <p:clrMapOvr>
+    <a:masterClrMapping/>
+  </p:clrMapOvr>
+</p:sld>
+</file>
+
+<file path=ppt/slides/slide4.xml><?xml version="1.0" encoding="utf-8"?>
+<p:sld xmlns:a="http://schemas.openxmlformats.org/drawingml/2006/main" xmlns:r="http://schemas.openxmlformats.org/officeDocument/2006/relationships" xmlns:p="http://schemas.openxmlformats.org/presentationml/2006/main">
+  <p:cSld>
+    <p:spTree>
+      <p:nvGrpSpPr>
+        <p:cNvPr id="1" name="">
+          <a:extLst>
+            <a:ext uri="{FF2B5EF4-FFF2-40B4-BE49-F238E27FC236}">
               <a16:creationId xmlns:a16="http://schemas.microsoft.com/office/drawing/2014/main" id="{5757EF92-DA22-43EF-9851-AEF3FC0A1EBD}"/>
             </a:ext>
           </a:extLst>
@@ -4507,7 +5650,7 @@
 </p:sld>
 </file>
 
-<file path=ppt/slides/slide4.xml><?xml version="1.0" encoding="utf-8"?>
+<file path=ppt/slides/slide5.xml><?xml version="1.0" encoding="utf-8"?>
 <p:sld xmlns:a="http://schemas.openxmlformats.org/drawingml/2006/main" xmlns:r="http://schemas.openxmlformats.org/officeDocument/2006/relationships" xmlns:p="http://schemas.openxmlformats.org/presentationml/2006/main">
   <p:cSld>
     <p:spTree>

</xml_diff>

<commit_message>
added cosmos db in arch
</commit_message>
<xml_diff>
--- a/docs/Media.pptx
+++ b/docs/Media.pptx
@@ -8,8 +8,9 @@
     <p:sldId id="256" r:id="rId2"/>
     <p:sldId id="257" r:id="rId3"/>
     <p:sldId id="260" r:id="rId4"/>
-    <p:sldId id="258" r:id="rId5"/>
-    <p:sldId id="259" r:id="rId6"/>
+    <p:sldId id="261" r:id="rId5"/>
+    <p:sldId id="258" r:id="rId6"/>
+    <p:sldId id="259" r:id="rId7"/>
   </p:sldIdLst>
   <p:sldSz cx="12192000" cy="6858000"/>
   <p:notesSz cx="6858000" cy="9144000"/>
@@ -263,7 +264,7 @@
           <a:p>
             <a:fld id="{011E3A52-CBF7-4130-8D1C-4AD0B509F5F3}" type="datetimeFigureOut">
               <a:rPr lang="en-US" smtClean="0"/>
-              <a:t>5/16/2025</a:t>
+              <a:t>5/19/2025</a:t>
             </a:fld>
             <a:endParaRPr lang="en-US"/>
           </a:p>
@@ -461,7 +462,7 @@
           <a:p>
             <a:fld id="{011E3A52-CBF7-4130-8D1C-4AD0B509F5F3}" type="datetimeFigureOut">
               <a:rPr lang="en-US" smtClean="0"/>
-              <a:t>5/16/2025</a:t>
+              <a:t>5/19/2025</a:t>
             </a:fld>
             <a:endParaRPr lang="en-US"/>
           </a:p>
@@ -669,7 +670,7 @@
           <a:p>
             <a:fld id="{011E3A52-CBF7-4130-8D1C-4AD0B509F5F3}" type="datetimeFigureOut">
               <a:rPr lang="en-US" smtClean="0"/>
-              <a:t>5/16/2025</a:t>
+              <a:t>5/19/2025</a:t>
             </a:fld>
             <a:endParaRPr lang="en-US"/>
           </a:p>
@@ -867,7 +868,7 @@
           <a:p>
             <a:fld id="{011E3A52-CBF7-4130-8D1C-4AD0B509F5F3}" type="datetimeFigureOut">
               <a:rPr lang="en-US" smtClean="0"/>
-              <a:t>5/16/2025</a:t>
+              <a:t>5/19/2025</a:t>
             </a:fld>
             <a:endParaRPr lang="en-US"/>
           </a:p>
@@ -1142,7 +1143,7 @@
           <a:p>
             <a:fld id="{011E3A52-CBF7-4130-8D1C-4AD0B509F5F3}" type="datetimeFigureOut">
               <a:rPr lang="en-US" smtClean="0"/>
-              <a:t>5/16/2025</a:t>
+              <a:t>5/19/2025</a:t>
             </a:fld>
             <a:endParaRPr lang="en-US"/>
           </a:p>
@@ -1407,7 +1408,7 @@
           <a:p>
             <a:fld id="{011E3A52-CBF7-4130-8D1C-4AD0B509F5F3}" type="datetimeFigureOut">
               <a:rPr lang="en-US" smtClean="0"/>
-              <a:t>5/16/2025</a:t>
+              <a:t>5/19/2025</a:t>
             </a:fld>
             <a:endParaRPr lang="en-US"/>
           </a:p>
@@ -1819,7 +1820,7 @@
           <a:p>
             <a:fld id="{011E3A52-CBF7-4130-8D1C-4AD0B509F5F3}" type="datetimeFigureOut">
               <a:rPr lang="en-US" smtClean="0"/>
-              <a:t>5/16/2025</a:t>
+              <a:t>5/19/2025</a:t>
             </a:fld>
             <a:endParaRPr lang="en-US"/>
           </a:p>
@@ -1960,7 +1961,7 @@
           <a:p>
             <a:fld id="{011E3A52-CBF7-4130-8D1C-4AD0B509F5F3}" type="datetimeFigureOut">
               <a:rPr lang="en-US" smtClean="0"/>
-              <a:t>5/16/2025</a:t>
+              <a:t>5/19/2025</a:t>
             </a:fld>
             <a:endParaRPr lang="en-US"/>
           </a:p>
@@ -2073,7 +2074,7 @@
           <a:p>
             <a:fld id="{011E3A52-CBF7-4130-8D1C-4AD0B509F5F3}" type="datetimeFigureOut">
               <a:rPr lang="en-US" smtClean="0"/>
-              <a:t>5/16/2025</a:t>
+              <a:t>5/19/2025</a:t>
             </a:fld>
             <a:endParaRPr lang="en-US"/>
           </a:p>
@@ -2384,7 +2385,7 @@
           <a:p>
             <a:fld id="{011E3A52-CBF7-4130-8D1C-4AD0B509F5F3}" type="datetimeFigureOut">
               <a:rPr lang="en-US" smtClean="0"/>
-              <a:t>5/16/2025</a:t>
+              <a:t>5/19/2025</a:t>
             </a:fld>
             <a:endParaRPr lang="en-US"/>
           </a:p>
@@ -2672,7 +2673,7 @@
           <a:p>
             <a:fld id="{011E3A52-CBF7-4130-8D1C-4AD0B509F5F3}" type="datetimeFigureOut">
               <a:rPr lang="en-US" smtClean="0"/>
-              <a:t>5/16/2025</a:t>
+              <a:t>5/19/2025</a:t>
             </a:fld>
             <a:endParaRPr lang="en-US"/>
           </a:p>
@@ -2913,7 +2914,7 @@
           <a:p>
             <a:fld id="{011E3A52-CBF7-4130-8D1C-4AD0B509F5F3}" type="datetimeFigureOut">
               <a:rPr lang="en-US" smtClean="0"/>
-              <a:t>5/16/2025</a:t>
+              <a:t>5/19/2025</a:t>
             </a:fld>
             <a:endParaRPr lang="en-US"/>
           </a:p>
@@ -5513,6 +5514,1075 @@
         <p:cNvPr id="1" name="">
           <a:extLst>
             <a:ext uri="{FF2B5EF4-FFF2-40B4-BE49-F238E27FC236}">
+              <a16:creationId xmlns:a16="http://schemas.microsoft.com/office/drawing/2014/main" id="{F21BFFEE-B537-C0B0-BEFE-B81B018ADBB5}"/>
+            </a:ext>
+          </a:extLst>
+        </p:cNvPr>
+        <p:cNvGrpSpPr/>
+        <p:nvPr/>
+      </p:nvGrpSpPr>
+      <p:grpSpPr>
+        <a:xfrm>
+          <a:off x="0" y="0"/>
+          <a:ext cx="0" cy="0"/>
+          <a:chOff x="0" y="0"/>
+          <a:chExt cx="0" cy="0"/>
+        </a:xfrm>
+      </p:grpSpPr>
+      <p:pic>
+        <p:nvPicPr>
+          <p:cNvPr id="7" name="Picture 6">
+            <a:extLst>
+              <a:ext uri="{FF2B5EF4-FFF2-40B4-BE49-F238E27FC236}">
+                <a16:creationId xmlns:a16="http://schemas.microsoft.com/office/drawing/2014/main" id="{4608A602-B725-555C-CA73-3A1966CC679B}"/>
+              </a:ext>
+            </a:extLst>
+          </p:cNvPr>
+          <p:cNvPicPr>
+            <a:picLocks noChangeAspect="1"/>
+          </p:cNvPicPr>
+          <p:nvPr/>
+        </p:nvPicPr>
+        <p:blipFill>
+          <a:blip r:embed="rId2"/>
+          <a:stretch>
+            <a:fillRect/>
+          </a:stretch>
+        </p:blipFill>
+        <p:spPr>
+          <a:xfrm>
+            <a:off x="1413655" y="3050102"/>
+            <a:ext cx="1038866" cy="1050945"/>
+          </a:xfrm>
+          <a:prstGeom prst="rect">
+            <a:avLst/>
+          </a:prstGeom>
+        </p:spPr>
+      </p:pic>
+      <p:sp>
+        <p:nvSpPr>
+          <p:cNvPr id="9" name="Rectangle 8">
+            <a:extLst>
+              <a:ext uri="{FF2B5EF4-FFF2-40B4-BE49-F238E27FC236}">
+                <a16:creationId xmlns:a16="http://schemas.microsoft.com/office/drawing/2014/main" id="{5E2D242B-E981-2CD4-C20B-D13882C4F56D}"/>
+              </a:ext>
+            </a:extLst>
+          </p:cNvPr>
+          <p:cNvSpPr/>
+          <p:nvPr/>
+        </p:nvSpPr>
+        <p:spPr>
+          <a:xfrm>
+            <a:off x="1068405" y="1886550"/>
+            <a:ext cx="1886951" cy="4071487"/>
+          </a:xfrm>
+          <a:prstGeom prst="rect">
+            <a:avLst/>
+          </a:prstGeom>
+          <a:noFill/>
+          <a:ln w="25400">
+            <a:solidFill>
+              <a:schemeClr val="accent4"/>
+            </a:solidFill>
+          </a:ln>
+        </p:spPr>
+        <p:style>
+          <a:lnRef idx="2">
+            <a:schemeClr val="accent1">
+              <a:shade val="15000"/>
+            </a:schemeClr>
+          </a:lnRef>
+          <a:fillRef idx="1">
+            <a:schemeClr val="accent1"/>
+          </a:fillRef>
+          <a:effectRef idx="0">
+            <a:schemeClr val="accent1"/>
+          </a:effectRef>
+          <a:fontRef idx="minor">
+            <a:schemeClr val="lt1"/>
+          </a:fontRef>
+        </p:style>
+        <p:txBody>
+          <a:bodyPr rtlCol="0" anchor="ctr"/>
+          <a:lstStyle/>
+          <a:p>
+            <a:pPr algn="ctr"/>
+            <a:endParaRPr lang="en-US"/>
+          </a:p>
+        </p:txBody>
+      </p:sp>
+      <p:pic>
+        <p:nvPicPr>
+          <p:cNvPr id="14" name="Picture 13" descr="A blue and pink logo&#10;&#10;AI-generated content may be incorrect.">
+            <a:extLst>
+              <a:ext uri="{FF2B5EF4-FFF2-40B4-BE49-F238E27FC236}">
+                <a16:creationId xmlns:a16="http://schemas.microsoft.com/office/drawing/2014/main" id="{F87B88DD-F3CF-B0A2-E316-27EF9466F698}"/>
+              </a:ext>
+            </a:extLst>
+          </p:cNvPr>
+          <p:cNvPicPr>
+            <a:picLocks noChangeAspect="1"/>
+          </p:cNvPicPr>
+          <p:nvPr/>
+        </p:nvPicPr>
+        <p:blipFill>
+          <a:blip r:embed="rId3">
+            <a:extLst>
+              <a:ext uri="{28A0092B-C50C-407E-A947-70E740481C1C}">
+                <a14:useLocalDpi xmlns:a14="http://schemas.microsoft.com/office/drawing/2010/main" val="0"/>
+              </a:ext>
+            </a:extLst>
+          </a:blip>
+          <a:stretch>
+            <a:fillRect/>
+          </a:stretch>
+        </p:blipFill>
+        <p:spPr>
+          <a:xfrm>
+            <a:off x="9205835" y="1886550"/>
+            <a:ext cx="2043339" cy="1263230"/>
+          </a:xfrm>
+          <a:prstGeom prst="rect">
+            <a:avLst/>
+          </a:prstGeom>
+        </p:spPr>
+      </p:pic>
+      <p:pic>
+        <p:nvPicPr>
+          <p:cNvPr id="16" name="Picture 15" descr="A blue container with a white elephant on it&#10;&#10;AI-generated content may be incorrect.">
+            <a:extLst>
+              <a:ext uri="{FF2B5EF4-FFF2-40B4-BE49-F238E27FC236}">
+                <a16:creationId xmlns:a16="http://schemas.microsoft.com/office/drawing/2014/main" id="{7C8B8A87-55E5-55F7-DF17-A482919CE104}"/>
+              </a:ext>
+            </a:extLst>
+          </p:cNvPr>
+          <p:cNvPicPr>
+            <a:picLocks noChangeAspect="1"/>
+          </p:cNvPicPr>
+          <p:nvPr/>
+        </p:nvPicPr>
+        <p:blipFill>
+          <a:blip r:embed="rId4">
+            <a:extLst>
+              <a:ext uri="{28A0092B-C50C-407E-A947-70E740481C1C}">
+                <a14:useLocalDpi xmlns:a14="http://schemas.microsoft.com/office/drawing/2010/main" val="0"/>
+              </a:ext>
+            </a:extLst>
+          </a:blip>
+          <a:stretch>
+            <a:fillRect/>
+          </a:stretch>
+        </p:blipFill>
+        <p:spPr>
+          <a:xfrm flipH="1">
+            <a:off x="9205835" y="3470128"/>
+            <a:ext cx="1468582" cy="802114"/>
+          </a:xfrm>
+          <a:prstGeom prst="rect">
+            <a:avLst/>
+          </a:prstGeom>
+        </p:spPr>
+      </p:pic>
+      <p:sp>
+        <p:nvSpPr>
+          <p:cNvPr id="19" name="Rectangle 18">
+            <a:extLst>
+              <a:ext uri="{FF2B5EF4-FFF2-40B4-BE49-F238E27FC236}">
+                <a16:creationId xmlns:a16="http://schemas.microsoft.com/office/drawing/2014/main" id="{79C8FBA3-327E-ABC7-AE6B-666DA7555186}"/>
+              </a:ext>
+            </a:extLst>
+          </p:cNvPr>
+          <p:cNvSpPr/>
+          <p:nvPr/>
+        </p:nvSpPr>
+        <p:spPr>
+          <a:xfrm>
+            <a:off x="3691839" y="1886551"/>
+            <a:ext cx="4922772" cy="4071488"/>
+          </a:xfrm>
+          <a:prstGeom prst="rect">
+            <a:avLst/>
+          </a:prstGeom>
+          <a:noFill/>
+          <a:ln w="25400">
+            <a:solidFill>
+              <a:schemeClr val="accent4"/>
+            </a:solidFill>
+          </a:ln>
+        </p:spPr>
+        <p:style>
+          <a:lnRef idx="2">
+            <a:schemeClr val="accent1">
+              <a:shade val="15000"/>
+            </a:schemeClr>
+          </a:lnRef>
+          <a:fillRef idx="1">
+            <a:schemeClr val="accent1"/>
+          </a:fillRef>
+          <a:effectRef idx="0">
+            <a:schemeClr val="accent1"/>
+          </a:effectRef>
+          <a:fontRef idx="minor">
+            <a:schemeClr val="lt1"/>
+          </a:fontRef>
+        </p:style>
+        <p:txBody>
+          <a:bodyPr rtlCol="0" anchor="ctr"/>
+          <a:lstStyle/>
+          <a:p>
+            <a:pPr algn="ctr"/>
+            <a:endParaRPr lang="en-US"/>
+          </a:p>
+        </p:txBody>
+      </p:sp>
+      <p:sp>
+        <p:nvSpPr>
+          <p:cNvPr id="22" name="Rectangle 21">
+            <a:extLst>
+              <a:ext uri="{FF2B5EF4-FFF2-40B4-BE49-F238E27FC236}">
+                <a16:creationId xmlns:a16="http://schemas.microsoft.com/office/drawing/2014/main" id="{1A281F4D-84F2-F184-3D5A-E2E9EB196CB1}"/>
+              </a:ext>
+            </a:extLst>
+          </p:cNvPr>
+          <p:cNvSpPr/>
+          <p:nvPr/>
+        </p:nvSpPr>
+        <p:spPr>
+          <a:xfrm>
+            <a:off x="3974421" y="4265823"/>
+            <a:ext cx="1626917" cy="1297577"/>
+          </a:xfrm>
+          <a:prstGeom prst="rect">
+            <a:avLst/>
+          </a:prstGeom>
+          <a:noFill/>
+          <a:ln>
+            <a:solidFill>
+              <a:schemeClr val="accent4"/>
+            </a:solidFill>
+          </a:ln>
+        </p:spPr>
+        <p:style>
+          <a:lnRef idx="2">
+            <a:schemeClr val="accent1">
+              <a:shade val="15000"/>
+            </a:schemeClr>
+          </a:lnRef>
+          <a:fillRef idx="1">
+            <a:schemeClr val="accent1"/>
+          </a:fillRef>
+          <a:effectRef idx="0">
+            <a:schemeClr val="accent1"/>
+          </a:effectRef>
+          <a:fontRef idx="minor">
+            <a:schemeClr val="lt1"/>
+          </a:fontRef>
+        </p:style>
+        <p:txBody>
+          <a:bodyPr rtlCol="0" anchor="ctr"/>
+          <a:lstStyle/>
+          <a:p>
+            <a:r>
+              <a:rPr lang="en-US" b="1" dirty="0">
+                <a:solidFill>
+                  <a:schemeClr val="tx1"/>
+                </a:solidFill>
+              </a:rPr>
+              <a:t>Login API</a:t>
+            </a:r>
+            <a:br>
+              <a:rPr lang="en-US" b="1" dirty="0">
+                <a:solidFill>
+                  <a:schemeClr val="tx1"/>
+                </a:solidFill>
+              </a:rPr>
+            </a:br>
+            <a:r>
+              <a:rPr lang="en-US" b="1" dirty="0">
+                <a:solidFill>
+                  <a:schemeClr val="tx1"/>
+                </a:solidFill>
+              </a:rPr>
+              <a:t>Logout API</a:t>
+            </a:r>
+          </a:p>
+          <a:p>
+            <a:r>
+              <a:rPr lang="en-US" sz="1600" dirty="0">
+                <a:solidFill>
+                  <a:schemeClr val="tx1"/>
+                </a:solidFill>
+              </a:rPr>
+              <a:t>User Authentication</a:t>
+            </a:r>
+          </a:p>
+        </p:txBody>
+      </p:sp>
+      <p:sp>
+        <p:nvSpPr>
+          <p:cNvPr id="23" name="Rectangle 22">
+            <a:extLst>
+              <a:ext uri="{FF2B5EF4-FFF2-40B4-BE49-F238E27FC236}">
+                <a16:creationId xmlns:a16="http://schemas.microsoft.com/office/drawing/2014/main" id="{03C4E6AD-6354-E6FC-3F10-55F951F76950}"/>
+              </a:ext>
+            </a:extLst>
+          </p:cNvPr>
+          <p:cNvSpPr/>
+          <p:nvPr/>
+        </p:nvSpPr>
+        <p:spPr>
+          <a:xfrm>
+            <a:off x="3974422" y="2651971"/>
+            <a:ext cx="1626917" cy="1527796"/>
+          </a:xfrm>
+          <a:prstGeom prst="rect">
+            <a:avLst/>
+          </a:prstGeom>
+          <a:noFill/>
+          <a:ln>
+            <a:solidFill>
+              <a:schemeClr val="accent4"/>
+            </a:solidFill>
+          </a:ln>
+        </p:spPr>
+        <p:style>
+          <a:lnRef idx="2">
+            <a:schemeClr val="accent1">
+              <a:shade val="15000"/>
+            </a:schemeClr>
+          </a:lnRef>
+          <a:fillRef idx="1">
+            <a:schemeClr val="accent1"/>
+          </a:fillRef>
+          <a:effectRef idx="0">
+            <a:schemeClr val="accent1"/>
+          </a:effectRef>
+          <a:fontRef idx="minor">
+            <a:schemeClr val="lt1"/>
+          </a:fontRef>
+        </p:style>
+        <p:txBody>
+          <a:bodyPr rtlCol="0" anchor="ctr"/>
+          <a:lstStyle/>
+          <a:p>
+            <a:r>
+              <a:rPr lang="en-US" b="1" dirty="0">
+                <a:solidFill>
+                  <a:schemeClr val="tx1"/>
+                </a:solidFill>
+              </a:rPr>
+              <a:t>Chat API</a:t>
+            </a:r>
+          </a:p>
+          <a:p>
+            <a:r>
+              <a:rPr lang="en-US" sz="1600" dirty="0">
+                <a:solidFill>
+                  <a:schemeClr val="tx1"/>
+                </a:solidFill>
+              </a:rPr>
+              <a:t>Chat with Shopping Agent</a:t>
+            </a:r>
+          </a:p>
+        </p:txBody>
+      </p:sp>
+      <p:sp>
+        <p:nvSpPr>
+          <p:cNvPr id="24" name="Rectangle 23">
+            <a:extLst>
+              <a:ext uri="{FF2B5EF4-FFF2-40B4-BE49-F238E27FC236}">
+                <a16:creationId xmlns:a16="http://schemas.microsoft.com/office/drawing/2014/main" id="{3B7E613A-00FA-7561-834C-39B719FC8730}"/>
+              </a:ext>
+            </a:extLst>
+          </p:cNvPr>
+          <p:cNvSpPr/>
+          <p:nvPr/>
+        </p:nvSpPr>
+        <p:spPr>
+          <a:xfrm>
+            <a:off x="5855472" y="2656566"/>
+            <a:ext cx="2403004" cy="1523201"/>
+          </a:xfrm>
+          <a:prstGeom prst="rect">
+            <a:avLst/>
+          </a:prstGeom>
+          <a:noFill/>
+          <a:ln>
+            <a:solidFill>
+              <a:schemeClr val="accent4"/>
+            </a:solidFill>
+          </a:ln>
+        </p:spPr>
+        <p:style>
+          <a:lnRef idx="2">
+            <a:schemeClr val="accent1">
+              <a:shade val="15000"/>
+            </a:schemeClr>
+          </a:lnRef>
+          <a:fillRef idx="1">
+            <a:schemeClr val="accent1"/>
+          </a:fillRef>
+          <a:effectRef idx="0">
+            <a:schemeClr val="accent1"/>
+          </a:effectRef>
+          <a:fontRef idx="minor">
+            <a:schemeClr val="lt1"/>
+          </a:fontRef>
+        </p:style>
+        <p:txBody>
+          <a:bodyPr rtlCol="0" anchor="ctr"/>
+          <a:lstStyle/>
+          <a:p>
+            <a:r>
+              <a:rPr lang="en-US" b="1" dirty="0">
+                <a:solidFill>
+                  <a:schemeClr val="tx1"/>
+                </a:solidFill>
+              </a:rPr>
+              <a:t>Semantic Kernel </a:t>
+            </a:r>
+          </a:p>
+          <a:p>
+            <a:r>
+              <a:rPr lang="en-US" sz="1600" dirty="0">
+                <a:solidFill>
+                  <a:schemeClr val="tx1"/>
+                </a:solidFill>
+              </a:rPr>
+              <a:t>Shop Managing Agent, Order Agent, </a:t>
+            </a:r>
+          </a:p>
+          <a:p>
+            <a:r>
+              <a:rPr lang="en-US" sz="1600" dirty="0">
+                <a:solidFill>
+                  <a:schemeClr val="tx1"/>
+                </a:solidFill>
+              </a:rPr>
+              <a:t>Cart Agent,</a:t>
+            </a:r>
+          </a:p>
+          <a:p>
+            <a:r>
+              <a:rPr lang="en-US" sz="1600" dirty="0">
+                <a:solidFill>
+                  <a:schemeClr val="tx1"/>
+                </a:solidFill>
+              </a:rPr>
+              <a:t>Offer Agent </a:t>
+            </a:r>
+          </a:p>
+        </p:txBody>
+      </p:sp>
+      <p:sp>
+        <p:nvSpPr>
+          <p:cNvPr id="25" name="Rectangle 24">
+            <a:extLst>
+              <a:ext uri="{FF2B5EF4-FFF2-40B4-BE49-F238E27FC236}">
+                <a16:creationId xmlns:a16="http://schemas.microsoft.com/office/drawing/2014/main" id="{E36EBB3E-D0DA-E5B1-AEC2-FB1D4165EB57}"/>
+              </a:ext>
+            </a:extLst>
+          </p:cNvPr>
+          <p:cNvSpPr/>
+          <p:nvPr/>
+        </p:nvSpPr>
+        <p:spPr>
+          <a:xfrm>
+            <a:off x="9333364" y="1886550"/>
+            <a:ext cx="2160862" cy="4071487"/>
+          </a:xfrm>
+          <a:prstGeom prst="rect">
+            <a:avLst/>
+          </a:prstGeom>
+          <a:noFill/>
+          <a:ln w="25400">
+            <a:solidFill>
+              <a:schemeClr val="accent4"/>
+            </a:solidFill>
+          </a:ln>
+        </p:spPr>
+        <p:style>
+          <a:lnRef idx="2">
+            <a:schemeClr val="accent1">
+              <a:shade val="15000"/>
+            </a:schemeClr>
+          </a:lnRef>
+          <a:fillRef idx="1">
+            <a:schemeClr val="accent1"/>
+          </a:fillRef>
+          <a:effectRef idx="0">
+            <a:schemeClr val="accent1"/>
+          </a:effectRef>
+          <a:fontRef idx="minor">
+            <a:schemeClr val="lt1"/>
+          </a:fontRef>
+        </p:style>
+        <p:txBody>
+          <a:bodyPr rtlCol="0" anchor="ctr"/>
+          <a:lstStyle/>
+          <a:p>
+            <a:pPr algn="ctr"/>
+            <a:endParaRPr lang="en-US"/>
+          </a:p>
+        </p:txBody>
+      </p:sp>
+      <p:sp>
+        <p:nvSpPr>
+          <p:cNvPr id="27" name="TextBox 26">
+            <a:extLst>
+              <a:ext uri="{FF2B5EF4-FFF2-40B4-BE49-F238E27FC236}">
+                <a16:creationId xmlns:a16="http://schemas.microsoft.com/office/drawing/2014/main" id="{9DA8E918-669D-47C8-FBAC-D54E777B066F}"/>
+              </a:ext>
+            </a:extLst>
+          </p:cNvPr>
+          <p:cNvSpPr txBox="1"/>
+          <p:nvPr/>
+        </p:nvSpPr>
+        <p:spPr>
+          <a:xfrm>
+            <a:off x="4192124" y="2053459"/>
+            <a:ext cx="3711972" cy="369332"/>
+          </a:xfrm>
+          <a:prstGeom prst="rect">
+            <a:avLst/>
+          </a:prstGeom>
+          <a:noFill/>
+        </p:spPr>
+        <p:txBody>
+          <a:bodyPr wrap="square">
+            <a:spAutoFit/>
+          </a:bodyPr>
+          <a:lstStyle/>
+          <a:p>
+            <a:r>
+              <a:rPr lang="en-US" b="1" dirty="0">
+                <a:solidFill>
+                  <a:schemeClr val="tx1"/>
+                </a:solidFill>
+              </a:rPr>
+              <a:t>Backend App (Python </a:t>
+            </a:r>
+            <a:r>
+              <a:rPr lang="en-US" b="1" dirty="0" err="1">
+                <a:solidFill>
+                  <a:schemeClr val="tx1"/>
+                </a:solidFill>
+              </a:rPr>
+              <a:t>FastAPI</a:t>
+            </a:r>
+            <a:r>
+              <a:rPr lang="en-US" b="1" dirty="0">
+                <a:solidFill>
+                  <a:schemeClr val="tx1"/>
+                </a:solidFill>
+              </a:rPr>
+              <a:t>) </a:t>
+            </a:r>
+          </a:p>
+        </p:txBody>
+      </p:sp>
+      <p:sp>
+        <p:nvSpPr>
+          <p:cNvPr id="28" name="Rectangle 27">
+            <a:extLst>
+              <a:ext uri="{FF2B5EF4-FFF2-40B4-BE49-F238E27FC236}">
+                <a16:creationId xmlns:a16="http://schemas.microsoft.com/office/drawing/2014/main" id="{EDA8011F-0CC6-6D04-3E4E-A04DFAE35F38}"/>
+              </a:ext>
+            </a:extLst>
+          </p:cNvPr>
+          <p:cNvSpPr/>
+          <p:nvPr/>
+        </p:nvSpPr>
+        <p:spPr>
+          <a:xfrm>
+            <a:off x="1251521" y="4214213"/>
+            <a:ext cx="1520717" cy="1370776"/>
+          </a:xfrm>
+          <a:prstGeom prst="rect">
+            <a:avLst/>
+          </a:prstGeom>
+          <a:noFill/>
+          <a:ln>
+            <a:solidFill>
+              <a:schemeClr val="accent4"/>
+            </a:solidFill>
+          </a:ln>
+        </p:spPr>
+        <p:style>
+          <a:lnRef idx="2">
+            <a:schemeClr val="accent1">
+              <a:shade val="15000"/>
+            </a:schemeClr>
+          </a:lnRef>
+          <a:fillRef idx="1">
+            <a:schemeClr val="accent1"/>
+          </a:fillRef>
+          <a:effectRef idx="0">
+            <a:schemeClr val="accent1"/>
+          </a:effectRef>
+          <a:fontRef idx="minor">
+            <a:schemeClr val="lt1"/>
+          </a:fontRef>
+        </p:style>
+        <p:txBody>
+          <a:bodyPr rtlCol="0" anchor="ctr"/>
+          <a:lstStyle/>
+          <a:p>
+            <a:r>
+              <a:rPr lang="en-US" sz="1600" b="1" dirty="0">
+                <a:solidFill>
+                  <a:schemeClr val="tx1"/>
+                </a:solidFill>
+              </a:rPr>
+              <a:t>UI Features</a:t>
+            </a:r>
+          </a:p>
+          <a:p>
+            <a:r>
+              <a:rPr lang="en-US" sz="1600" dirty="0">
+                <a:solidFill>
+                  <a:schemeClr val="tx1"/>
+                </a:solidFill>
+              </a:rPr>
+              <a:t>User Register</a:t>
+            </a:r>
+          </a:p>
+          <a:p>
+            <a:r>
+              <a:rPr lang="en-US" sz="1600" dirty="0">
+                <a:solidFill>
+                  <a:schemeClr val="tx1"/>
+                </a:solidFill>
+              </a:rPr>
+              <a:t>User Login</a:t>
+            </a:r>
+          </a:p>
+          <a:p>
+            <a:r>
+              <a:rPr lang="en-US" sz="1600" dirty="0">
+                <a:solidFill>
+                  <a:schemeClr val="tx1"/>
+                </a:solidFill>
+              </a:rPr>
+              <a:t>User Logout </a:t>
+            </a:r>
+          </a:p>
+          <a:p>
+            <a:r>
+              <a:rPr lang="en-US" sz="1600" dirty="0">
+                <a:solidFill>
+                  <a:schemeClr val="tx1"/>
+                </a:solidFill>
+              </a:rPr>
+              <a:t>Chat </a:t>
+            </a:r>
+          </a:p>
+        </p:txBody>
+      </p:sp>
+      <p:sp>
+        <p:nvSpPr>
+          <p:cNvPr id="29" name="TextBox 28">
+            <a:extLst>
+              <a:ext uri="{FF2B5EF4-FFF2-40B4-BE49-F238E27FC236}">
+                <a16:creationId xmlns:a16="http://schemas.microsoft.com/office/drawing/2014/main" id="{A0369105-2D9B-E03C-F5E9-C6250D7C37C5}"/>
+              </a:ext>
+            </a:extLst>
+          </p:cNvPr>
+          <p:cNvSpPr txBox="1"/>
+          <p:nvPr/>
+        </p:nvSpPr>
+        <p:spPr>
+          <a:xfrm>
+            <a:off x="1072154" y="2013606"/>
+            <a:ext cx="1879449" cy="923330"/>
+          </a:xfrm>
+          <a:prstGeom prst="rect">
+            <a:avLst/>
+          </a:prstGeom>
+          <a:noFill/>
+        </p:spPr>
+        <p:txBody>
+          <a:bodyPr wrap="square">
+            <a:spAutoFit/>
+          </a:bodyPr>
+          <a:lstStyle/>
+          <a:p>
+            <a:r>
+              <a:rPr lang="en-US" b="1" dirty="0"/>
+              <a:t>Frontend </a:t>
+            </a:r>
+          </a:p>
+          <a:p>
+            <a:r>
+              <a:rPr lang="en-US" b="1" dirty="0"/>
+              <a:t>Web App (React)</a:t>
+            </a:r>
+            <a:endParaRPr lang="en-US" b="1" dirty="0">
+              <a:solidFill>
+                <a:schemeClr val="tx1"/>
+              </a:solidFill>
+            </a:endParaRPr>
+          </a:p>
+        </p:txBody>
+      </p:sp>
+      <p:cxnSp>
+        <p:nvCxnSpPr>
+          <p:cNvPr id="31" name="Straight Arrow Connector 30">
+            <a:extLst>
+              <a:ext uri="{FF2B5EF4-FFF2-40B4-BE49-F238E27FC236}">
+                <a16:creationId xmlns:a16="http://schemas.microsoft.com/office/drawing/2014/main" id="{584AAB8F-4B74-EAC6-8278-9CEE1E13FAF2}"/>
+              </a:ext>
+            </a:extLst>
+          </p:cNvPr>
+          <p:cNvCxnSpPr>
+            <a:cxnSpLocks/>
+            <a:stCxn id="9" idx="3"/>
+            <a:endCxn id="19" idx="1"/>
+          </p:cNvCxnSpPr>
+          <p:nvPr/>
+        </p:nvCxnSpPr>
+        <p:spPr>
+          <a:xfrm>
+            <a:off x="2955356" y="3922294"/>
+            <a:ext cx="736483" cy="1"/>
+          </a:xfrm>
+          <a:prstGeom prst="straightConnector1">
+            <a:avLst/>
+          </a:prstGeom>
+          <a:ln w="25400">
+            <a:solidFill>
+              <a:schemeClr val="accent4"/>
+            </a:solidFill>
+            <a:headEnd type="triangle"/>
+            <a:tailEnd type="triangle"/>
+          </a:ln>
+        </p:spPr>
+        <p:style>
+          <a:lnRef idx="2">
+            <a:schemeClr val="accent1"/>
+          </a:lnRef>
+          <a:fillRef idx="0">
+            <a:schemeClr val="accent1"/>
+          </a:fillRef>
+          <a:effectRef idx="1">
+            <a:schemeClr val="accent1"/>
+          </a:effectRef>
+          <a:fontRef idx="minor">
+            <a:schemeClr val="tx1"/>
+          </a:fontRef>
+        </p:style>
+      </p:cxnSp>
+      <p:cxnSp>
+        <p:nvCxnSpPr>
+          <p:cNvPr id="32" name="Straight Arrow Connector 31">
+            <a:extLst>
+              <a:ext uri="{FF2B5EF4-FFF2-40B4-BE49-F238E27FC236}">
+                <a16:creationId xmlns:a16="http://schemas.microsoft.com/office/drawing/2014/main" id="{9FFABE3B-DCC1-A896-346B-E7543D91B781}"/>
+              </a:ext>
+            </a:extLst>
+          </p:cNvPr>
+          <p:cNvCxnSpPr/>
+          <p:nvPr/>
+        </p:nvCxnSpPr>
+        <p:spPr>
+          <a:xfrm>
+            <a:off x="8596881" y="3884174"/>
+            <a:ext cx="736483" cy="0"/>
+          </a:xfrm>
+          <a:prstGeom prst="straightConnector1">
+            <a:avLst/>
+          </a:prstGeom>
+          <a:ln w="25400">
+            <a:solidFill>
+              <a:schemeClr val="accent4"/>
+            </a:solidFill>
+            <a:headEnd type="triangle"/>
+            <a:tailEnd type="triangle"/>
+          </a:ln>
+        </p:spPr>
+        <p:style>
+          <a:lnRef idx="2">
+            <a:schemeClr val="accent1"/>
+          </a:lnRef>
+          <a:fillRef idx="0">
+            <a:schemeClr val="accent1"/>
+          </a:fillRef>
+          <a:effectRef idx="1">
+            <a:schemeClr val="accent1"/>
+          </a:effectRef>
+          <a:fontRef idx="minor">
+            <a:schemeClr val="tx1"/>
+          </a:fontRef>
+        </p:style>
+      </p:cxnSp>
+      <p:sp>
+        <p:nvSpPr>
+          <p:cNvPr id="33" name="TextBox 32">
+            <a:extLst>
+              <a:ext uri="{FF2B5EF4-FFF2-40B4-BE49-F238E27FC236}">
+                <a16:creationId xmlns:a16="http://schemas.microsoft.com/office/drawing/2014/main" id="{0067A22A-7E50-51C0-D47B-E4E98657EDBA}"/>
+              </a:ext>
+            </a:extLst>
+          </p:cNvPr>
+          <p:cNvSpPr txBox="1"/>
+          <p:nvPr/>
+        </p:nvSpPr>
+        <p:spPr>
+          <a:xfrm>
+            <a:off x="5726000" y="4363071"/>
+            <a:ext cx="2589299" cy="1107996"/>
+          </a:xfrm>
+          <a:prstGeom prst="rect">
+            <a:avLst/>
+          </a:prstGeom>
+          <a:noFill/>
+        </p:spPr>
+        <p:txBody>
+          <a:bodyPr wrap="none" rtlCol="0">
+            <a:spAutoFit/>
+          </a:bodyPr>
+          <a:lstStyle/>
+          <a:p>
+            <a:r>
+              <a:rPr lang="en-US" b="1" dirty="0"/>
+              <a:t>Notes: </a:t>
+            </a:r>
+          </a:p>
+          <a:p>
+            <a:r>
+              <a:rPr lang="en-US" sz="1600" dirty="0"/>
+              <a:t>Secure Login </a:t>
+            </a:r>
+          </a:p>
+          <a:p>
+            <a:r>
+              <a:rPr lang="en-US" sz="1600" dirty="0"/>
+              <a:t>Token returns to Web App</a:t>
+            </a:r>
+          </a:p>
+          <a:p>
+            <a:r>
+              <a:rPr lang="en-US" sz="1600" dirty="0"/>
+              <a:t>Chat UI appears after Login</a:t>
+            </a:r>
+          </a:p>
+        </p:txBody>
+      </p:sp>
+      <p:pic>
+        <p:nvPicPr>
+          <p:cNvPr id="36" name="Picture 35">
+            <a:extLst>
+              <a:ext uri="{FF2B5EF4-FFF2-40B4-BE49-F238E27FC236}">
+                <a16:creationId xmlns:a16="http://schemas.microsoft.com/office/drawing/2014/main" id="{512E3B0E-400F-3BFC-9071-C5FD19A14A7C}"/>
+              </a:ext>
+            </a:extLst>
+          </p:cNvPr>
+          <p:cNvPicPr>
+            <a:picLocks noChangeAspect="1"/>
+          </p:cNvPicPr>
+          <p:nvPr/>
+        </p:nvPicPr>
+        <p:blipFill>
+          <a:blip r:embed="rId5"/>
+          <a:stretch>
+            <a:fillRect/>
+          </a:stretch>
+        </p:blipFill>
+        <p:spPr>
+          <a:xfrm>
+            <a:off x="9960195" y="4528771"/>
+            <a:ext cx="938120" cy="771680"/>
+          </a:xfrm>
+          <a:prstGeom prst="rect">
+            <a:avLst/>
+          </a:prstGeom>
+        </p:spPr>
+      </p:pic>
+      <p:sp>
+        <p:nvSpPr>
+          <p:cNvPr id="38" name="Rectangle 37">
+            <a:extLst>
+              <a:ext uri="{FF2B5EF4-FFF2-40B4-BE49-F238E27FC236}">
+                <a16:creationId xmlns:a16="http://schemas.microsoft.com/office/drawing/2014/main" id="{910C9309-A1B4-486A-A1CF-5908B129C10B}"/>
+              </a:ext>
+            </a:extLst>
+          </p:cNvPr>
+          <p:cNvSpPr/>
+          <p:nvPr/>
+        </p:nvSpPr>
+        <p:spPr>
+          <a:xfrm>
+            <a:off x="2560907" y="576527"/>
+            <a:ext cx="6330185" cy="627861"/>
+          </a:xfrm>
+          <a:prstGeom prst="rect">
+            <a:avLst/>
+          </a:prstGeom>
+          <a:noFill/>
+          <a:ln>
+            <a:noFill/>
+          </a:ln>
+        </p:spPr>
+        <p:style>
+          <a:lnRef idx="2">
+            <a:schemeClr val="accent1">
+              <a:shade val="15000"/>
+            </a:schemeClr>
+          </a:lnRef>
+          <a:fillRef idx="1">
+            <a:schemeClr val="accent1"/>
+          </a:fillRef>
+          <a:effectRef idx="0">
+            <a:schemeClr val="accent1"/>
+          </a:effectRef>
+          <a:fontRef idx="minor">
+            <a:schemeClr val="lt1"/>
+          </a:fontRef>
+        </p:style>
+        <p:txBody>
+          <a:bodyPr rtlCol="0" anchor="ctr"/>
+          <a:lstStyle/>
+          <a:p>
+            <a:r>
+              <a:rPr lang="en-US" sz="3200" b="1" dirty="0">
+                <a:solidFill>
+                  <a:schemeClr val="tx1"/>
+                </a:solidFill>
+              </a:rPr>
+              <a:t>Shopping Assistant Architecture </a:t>
+            </a:r>
+          </a:p>
+        </p:txBody>
+      </p:sp>
+      <p:pic>
+        <p:nvPicPr>
+          <p:cNvPr id="3" name="Picture 2" descr="A logo of a company&#10;&#10;AI-generated content may be incorrect.">
+            <a:extLst>
+              <a:ext uri="{FF2B5EF4-FFF2-40B4-BE49-F238E27FC236}">
+                <a16:creationId xmlns:a16="http://schemas.microsoft.com/office/drawing/2014/main" id="{1EDD8CF9-010E-4E49-68ED-2417FD4E0B33}"/>
+              </a:ext>
+            </a:extLst>
+          </p:cNvPr>
+          <p:cNvPicPr>
+            <a:picLocks noChangeAspect="1"/>
+          </p:cNvPicPr>
+          <p:nvPr/>
+        </p:nvPicPr>
+        <p:blipFill>
+          <a:blip r:embed="rId6">
+            <a:extLst>
+              <a:ext uri="{28A0092B-C50C-407E-A947-70E740481C1C}">
+                <a14:useLocalDpi xmlns:a14="http://schemas.microsoft.com/office/drawing/2010/main" val="0"/>
+              </a:ext>
+            </a:extLst>
+          </a:blip>
+          <a:stretch>
+            <a:fillRect/>
+          </a:stretch>
+        </p:blipFill>
+        <p:spPr>
+          <a:xfrm>
+            <a:off x="2204678" y="1973611"/>
+            <a:ext cx="712457" cy="634735"/>
+          </a:xfrm>
+          <a:prstGeom prst="rect">
+            <a:avLst/>
+          </a:prstGeom>
+        </p:spPr>
+      </p:pic>
+      <p:pic>
+        <p:nvPicPr>
+          <p:cNvPr id="4" name="Picture 3" descr="A logo of a company&#10;&#10;AI-generated content may be incorrect.">
+            <a:extLst>
+              <a:ext uri="{FF2B5EF4-FFF2-40B4-BE49-F238E27FC236}">
+                <a16:creationId xmlns:a16="http://schemas.microsoft.com/office/drawing/2014/main" id="{75266972-06CA-7B54-5BC3-97D41F0AD86C}"/>
+              </a:ext>
+            </a:extLst>
+          </p:cNvPr>
+          <p:cNvPicPr>
+            <a:picLocks noChangeAspect="1"/>
+          </p:cNvPicPr>
+          <p:nvPr/>
+        </p:nvPicPr>
+        <p:blipFill>
+          <a:blip r:embed="rId6">
+            <a:extLst>
+              <a:ext uri="{28A0092B-C50C-407E-A947-70E740481C1C}">
+                <a14:useLocalDpi xmlns:a14="http://schemas.microsoft.com/office/drawing/2010/main" val="0"/>
+              </a:ext>
+            </a:extLst>
+          </a:blip>
+          <a:stretch>
+            <a:fillRect/>
+          </a:stretch>
+        </p:blipFill>
+        <p:spPr>
+          <a:xfrm>
+            <a:off x="7682461" y="1920757"/>
+            <a:ext cx="712457" cy="634735"/>
+          </a:xfrm>
+          <a:prstGeom prst="rect">
+            <a:avLst/>
+          </a:prstGeom>
+        </p:spPr>
+      </p:pic>
+      <p:pic>
+        <p:nvPicPr>
+          <p:cNvPr id="5" name="Picture 4" descr="A blue planet with white clouds and stars&#10;&#10;AI-generated content may be incorrect.">
+            <a:extLst>
+              <a:ext uri="{FF2B5EF4-FFF2-40B4-BE49-F238E27FC236}">
+                <a16:creationId xmlns:a16="http://schemas.microsoft.com/office/drawing/2014/main" id="{5689AE1A-282E-DC6B-B788-9DB6B6716440}"/>
+              </a:ext>
+            </a:extLst>
+          </p:cNvPr>
+          <p:cNvPicPr>
+            <a:picLocks noChangeAspect="1"/>
+          </p:cNvPicPr>
+          <p:nvPr/>
+        </p:nvPicPr>
+        <p:blipFill>
+          <a:blip r:embed="rId7">
+            <a:extLst>
+              <a:ext uri="{28A0092B-C50C-407E-A947-70E740481C1C}">
+                <a14:useLocalDpi xmlns:a14="http://schemas.microsoft.com/office/drawing/2010/main" val="0"/>
+              </a:ext>
+            </a:extLst>
+          </a:blip>
+          <a:stretch>
+            <a:fillRect/>
+          </a:stretch>
+        </p:blipFill>
+        <p:spPr>
+          <a:xfrm>
+            <a:off x="10280723" y="3403052"/>
+            <a:ext cx="1213503" cy="910828"/>
+          </a:xfrm>
+          <a:prstGeom prst="rect">
+            <a:avLst/>
+          </a:prstGeom>
+        </p:spPr>
+      </p:pic>
+    </p:spTree>
+    <p:extLst>
+      <p:ext uri="{BB962C8B-B14F-4D97-AF65-F5344CB8AC3E}">
+        <p14:creationId xmlns:p14="http://schemas.microsoft.com/office/powerpoint/2010/main" val="224983834"/>
+      </p:ext>
+    </p:extLst>
+  </p:cSld>
+  <p:clrMapOvr>
+    <a:masterClrMapping/>
+  </p:clrMapOvr>
+</p:sld>
+</file>
+
+<file path=ppt/slides/slide5.xml><?xml version="1.0" encoding="utf-8"?>
+<p:sld xmlns:a="http://schemas.openxmlformats.org/drawingml/2006/main" xmlns:r="http://schemas.openxmlformats.org/officeDocument/2006/relationships" xmlns:p="http://schemas.openxmlformats.org/presentationml/2006/main">
+  <p:cSld>
+    <p:spTree>
+      <p:nvGrpSpPr>
+        <p:cNvPr id="1" name="">
+          <a:extLst>
+            <a:ext uri="{FF2B5EF4-FFF2-40B4-BE49-F238E27FC236}">
               <a16:creationId xmlns:a16="http://schemas.microsoft.com/office/drawing/2014/main" id="{5757EF92-DA22-43EF-9851-AEF3FC0A1EBD}"/>
             </a:ext>
           </a:extLst>
@@ -5541,7 +6611,7 @@
 </p:sld>
 </file>
 
-<file path=ppt/slides/slide5.xml><?xml version="1.0" encoding="utf-8"?>
+<file path=ppt/slides/slide6.xml><?xml version="1.0" encoding="utf-8"?>
 <p:sld xmlns:a="http://schemas.openxmlformats.org/drawingml/2006/main" xmlns:r="http://schemas.openxmlformats.org/officeDocument/2006/relationships" xmlns:p="http://schemas.openxmlformats.org/presentationml/2006/main">
   <p:cSld>
     <p:spTree>

</xml_diff>